<commit_message>
Edit file code dan file ppt
</commit_message>
<xml_diff>
--- a/Hotel_Bussiness.pptx
+++ b/Hotel_Bussiness.pptx
@@ -6,27 +6,29 @@
     <p:sldMasterId id="2147483671" r:id="rId2"/>
   </p:sldMasterIdLst>
   <p:notesMasterIdLst>
-    <p:notesMasterId r:id="rId6"/>
+    <p:notesMasterId r:id="rId8"/>
   </p:notesMasterIdLst>
   <p:sldIdLst>
     <p:sldId id="256" r:id="rId3"/>
     <p:sldId id="257" r:id="rId4"/>
     <p:sldId id="258" r:id="rId5"/>
+    <p:sldId id="259" r:id="rId6"/>
+    <p:sldId id="260" r:id="rId7"/>
   </p:sldIdLst>
   <p:sldSz cx="9144000" cy="5143500" type="screen16x9"/>
   <p:notesSz cx="6858000" cy="9144000"/>
   <p:embeddedFontLst>
     <p:embeddedFont>
       <p:font typeface="Dosis" pitchFamily="2" charset="0"/>
-      <p:regular r:id="rId7"/>
-      <p:bold r:id="rId8"/>
+      <p:regular r:id="rId9"/>
+      <p:bold r:id="rId10"/>
     </p:embeddedFont>
     <p:embeddedFont>
       <p:font typeface="Roboto" panose="02000000000000000000" pitchFamily="2" charset="0"/>
-      <p:regular r:id="rId9"/>
-      <p:bold r:id="rId10"/>
-      <p:italic r:id="rId11"/>
-      <p:boldItalic r:id="rId12"/>
+      <p:regular r:id="rId11"/>
+      <p:bold r:id="rId12"/>
+      <p:italic r:id="rId13"/>
+      <p:boldItalic r:id="rId14"/>
     </p:embeddedFont>
   </p:embeddedFontLst>
   <p:defaultTextStyle>
@@ -13226,6 +13228,958 @@
         </p:txBody>
       </p:sp>
     </p:spTree>
+  </p:cSld>
+  <p:clrMapOvr>
+    <a:masterClrMapping/>
+  </p:clrMapOvr>
+</p:sld>
+</file>
+
+<file path=ppt/slides/slide4.xml><?xml version="1.0" encoding="utf-8"?>
+<p:sld xmlns:a="http://schemas.openxmlformats.org/drawingml/2006/main" xmlns:r="http://schemas.openxmlformats.org/officeDocument/2006/relationships" xmlns:p="http://schemas.openxmlformats.org/presentationml/2006/main">
+  <p:cSld>
+    <p:spTree>
+      <p:nvGrpSpPr>
+        <p:cNvPr id="1" name=""/>
+        <p:cNvGrpSpPr/>
+        <p:nvPr/>
+      </p:nvGrpSpPr>
+      <p:grpSpPr>
+        <a:xfrm>
+          <a:off x="0" y="0"/>
+          <a:ext cx="0" cy="0"/>
+          <a:chOff x="0" y="0"/>
+          <a:chExt cx="0" cy="0"/>
+        </a:xfrm>
+      </p:grpSpPr>
+      <p:pic>
+        <p:nvPicPr>
+          <p:cNvPr id="8" name="Picture 7">
+            <a:extLst>
+              <a:ext uri="{FF2B5EF4-FFF2-40B4-BE49-F238E27FC236}">
+                <a16:creationId xmlns:a16="http://schemas.microsoft.com/office/drawing/2014/main" id="{233F5DF1-2B5E-5755-BF3D-DDE2045B0E98}"/>
+              </a:ext>
+            </a:extLst>
+          </p:cNvPr>
+          <p:cNvPicPr>
+            <a:picLocks noChangeAspect="1"/>
+          </p:cNvPicPr>
+          <p:nvPr/>
+        </p:nvPicPr>
+        <p:blipFill>
+          <a:blip r:embed="rId2"/>
+          <a:stretch>
+            <a:fillRect/>
+          </a:stretch>
+        </p:blipFill>
+        <p:spPr>
+          <a:xfrm>
+            <a:off x="0" y="2455684"/>
+            <a:ext cx="3770142" cy="2692959"/>
+          </a:xfrm>
+          <a:prstGeom prst="rect">
+            <a:avLst/>
+          </a:prstGeom>
+        </p:spPr>
+      </p:pic>
+      <p:sp>
+        <p:nvSpPr>
+          <p:cNvPr id="9" name="TextBox 8">
+            <a:extLst>
+              <a:ext uri="{FF2B5EF4-FFF2-40B4-BE49-F238E27FC236}">
+                <a16:creationId xmlns:a16="http://schemas.microsoft.com/office/drawing/2014/main" id="{7C4F9A78-BE7B-1E93-9A24-554FA001E78A}"/>
+              </a:ext>
+            </a:extLst>
+          </p:cNvPr>
+          <p:cNvSpPr txBox="1"/>
+          <p:nvPr/>
+        </p:nvSpPr>
+        <p:spPr>
+          <a:xfrm>
+            <a:off x="161778" y="615552"/>
+            <a:ext cx="3608364" cy="1785104"/>
+          </a:xfrm>
+          <a:prstGeom prst="rect">
+            <a:avLst/>
+          </a:prstGeom>
+          <a:noFill/>
+        </p:spPr>
+        <p:txBody>
+          <a:bodyPr wrap="square" rtlCol="0">
+            <a:spAutoFit/>
+          </a:bodyPr>
+          <a:lstStyle/>
+          <a:p>
+            <a:pPr algn="just"/>
+            <a:r>
+              <a:rPr lang="en-US" sz="1100" dirty="0"/>
+              <a:t>Dari </a:t>
+            </a:r>
+            <a:r>
+              <a:rPr lang="en-US" sz="1100" dirty="0" err="1"/>
+              <a:t>gambar</a:t>
+            </a:r>
+            <a:r>
+              <a:rPr lang="en-US" sz="1100" dirty="0"/>
+              <a:t> di </a:t>
+            </a:r>
+            <a:r>
+              <a:rPr lang="en-US" sz="1100" dirty="0" err="1"/>
+              <a:t>bawah</a:t>
+            </a:r>
+            <a:r>
+              <a:rPr lang="en-US" sz="1100" dirty="0"/>
+              <a:t> </a:t>
+            </a:r>
+            <a:r>
+              <a:rPr lang="en-US" sz="1100" dirty="0" err="1"/>
+              <a:t>diperoleh</a:t>
+            </a:r>
+            <a:r>
+              <a:rPr lang="en-US" sz="1100" dirty="0"/>
+              <a:t> </a:t>
+            </a:r>
+            <a:r>
+              <a:rPr lang="en-US" sz="1100" dirty="0" err="1"/>
+              <a:t>informasi</a:t>
+            </a:r>
+            <a:r>
+              <a:rPr lang="en-US" sz="1100" dirty="0"/>
+              <a:t> </a:t>
+            </a:r>
+            <a:r>
+              <a:rPr lang="en-US" sz="1100" dirty="0" err="1"/>
+              <a:t>bahwa</a:t>
+            </a:r>
+            <a:r>
+              <a:rPr lang="en-US" sz="1100" dirty="0"/>
+              <a:t> pada </a:t>
+            </a:r>
+            <a:r>
+              <a:rPr lang="en-US" sz="1100" dirty="0" err="1"/>
+              <a:t>tahun</a:t>
+            </a:r>
+            <a:r>
+              <a:rPr lang="en-US" sz="1100" dirty="0"/>
+              <a:t> 2018 </a:t>
+            </a:r>
+            <a:r>
+              <a:rPr lang="en-US" sz="1100" dirty="0" err="1"/>
+              <a:t>terjadi</a:t>
+            </a:r>
+            <a:r>
+              <a:rPr lang="en-US" sz="1100" dirty="0"/>
+              <a:t> </a:t>
+            </a:r>
+            <a:r>
+              <a:rPr lang="en-US" sz="1100" dirty="0" err="1"/>
+              <a:t>lonjakan</a:t>
+            </a:r>
+            <a:r>
+              <a:rPr lang="en-US" sz="1100" dirty="0"/>
+              <a:t> </a:t>
+            </a:r>
+            <a:r>
+              <a:rPr lang="en-US" sz="1100" dirty="0" err="1"/>
+              <a:t>pengunjung</a:t>
+            </a:r>
+            <a:r>
+              <a:rPr lang="en-US" sz="1100" dirty="0"/>
+              <a:t> yang </a:t>
+            </a:r>
+            <a:r>
+              <a:rPr lang="en-US" sz="1100" dirty="0" err="1"/>
+              <a:t>datang</a:t>
+            </a:r>
+            <a:r>
+              <a:rPr lang="en-US" sz="1100" dirty="0"/>
+              <a:t> </a:t>
+            </a:r>
+            <a:r>
+              <a:rPr lang="en-US" sz="1100" dirty="0" err="1"/>
+              <a:t>untuk</a:t>
+            </a:r>
+            <a:r>
+              <a:rPr lang="en-US" sz="1100" dirty="0"/>
+              <a:t> </a:t>
+            </a:r>
+            <a:r>
+              <a:rPr lang="en-US" sz="1100" dirty="0" err="1"/>
+              <a:t>memesan</a:t>
+            </a:r>
+            <a:r>
+              <a:rPr lang="en-US" sz="1100" dirty="0"/>
+              <a:t> hotel. </a:t>
+            </a:r>
+            <a:r>
+              <a:rPr lang="en-US" sz="1100" dirty="0" err="1"/>
+              <a:t>Artinya</a:t>
+            </a:r>
+            <a:r>
+              <a:rPr lang="en-US" sz="1100" dirty="0"/>
+              <a:t> </a:t>
+            </a:r>
+            <a:r>
+              <a:rPr lang="en-US" sz="1100" dirty="0" err="1"/>
+              <a:t>promosi</a:t>
+            </a:r>
+            <a:r>
+              <a:rPr lang="en-US" sz="1100" dirty="0"/>
+              <a:t> yang </a:t>
+            </a:r>
+            <a:r>
+              <a:rPr lang="en-US" sz="1100" dirty="0" err="1"/>
+              <a:t>dilakukan</a:t>
+            </a:r>
+            <a:r>
+              <a:rPr lang="en-US" sz="1100" dirty="0"/>
+              <a:t> </a:t>
+            </a:r>
+            <a:r>
+              <a:rPr lang="en-US" sz="1100" dirty="0" err="1"/>
+              <a:t>untuk</a:t>
+            </a:r>
+            <a:r>
+              <a:rPr lang="en-US" sz="1100" dirty="0"/>
+              <a:t> </a:t>
+            </a:r>
+            <a:r>
+              <a:rPr lang="en-US" sz="1100" dirty="0" err="1"/>
+              <a:t>menarik</a:t>
+            </a:r>
+            <a:r>
+              <a:rPr lang="en-US" sz="1100" dirty="0"/>
+              <a:t> </a:t>
+            </a:r>
+            <a:r>
+              <a:rPr lang="en-US" sz="1100" dirty="0" err="1"/>
+              <a:t>perhatian</a:t>
+            </a:r>
+            <a:r>
+              <a:rPr lang="en-US" sz="1100" dirty="0"/>
+              <a:t> </a:t>
+            </a:r>
+            <a:r>
+              <a:rPr lang="en-US" sz="1100" dirty="0" err="1"/>
+              <a:t>sudah</a:t>
+            </a:r>
+            <a:r>
+              <a:rPr lang="en-US" sz="1100" dirty="0"/>
+              <a:t> </a:t>
+            </a:r>
+            <a:r>
+              <a:rPr lang="en-US" sz="1100" dirty="0" err="1"/>
+              <a:t>berhasil</a:t>
+            </a:r>
+            <a:r>
+              <a:rPr lang="en-US" sz="1100" dirty="0"/>
+              <a:t> di </a:t>
+            </a:r>
+            <a:r>
+              <a:rPr lang="en-US" sz="1100" dirty="0" err="1"/>
+              <a:t>tahun</a:t>
+            </a:r>
+            <a:r>
+              <a:rPr lang="en-US" sz="1100" dirty="0"/>
+              <a:t> 2018. </a:t>
+            </a:r>
+            <a:r>
+              <a:rPr lang="en-US" sz="1100" dirty="0" err="1"/>
+              <a:t>Namun</a:t>
+            </a:r>
+            <a:r>
+              <a:rPr lang="en-US" sz="1100" dirty="0"/>
+              <a:t> </a:t>
+            </a:r>
+            <a:r>
+              <a:rPr lang="en-US" sz="1100" dirty="0" err="1"/>
+              <a:t>seiring</a:t>
+            </a:r>
+            <a:r>
+              <a:rPr lang="en-US" sz="1100" dirty="0"/>
+              <a:t> </a:t>
+            </a:r>
+            <a:r>
+              <a:rPr lang="en-US" sz="1100" dirty="0" err="1"/>
+              <a:t>berjalannya</a:t>
+            </a:r>
+            <a:r>
+              <a:rPr lang="en-US" sz="1100" dirty="0"/>
+              <a:t> </a:t>
+            </a:r>
+            <a:r>
+              <a:rPr lang="en-US" sz="1100" dirty="0" err="1"/>
+              <a:t>waktu</a:t>
+            </a:r>
+            <a:r>
+              <a:rPr lang="en-US" sz="1100" dirty="0"/>
+              <a:t> </a:t>
+            </a:r>
+            <a:r>
+              <a:rPr lang="en-US" sz="1100" dirty="0" err="1"/>
+              <a:t>promosi</a:t>
+            </a:r>
+            <a:r>
+              <a:rPr lang="en-US" sz="1100" dirty="0"/>
+              <a:t> yang </a:t>
+            </a:r>
+            <a:r>
+              <a:rPr lang="en-US" sz="1100" dirty="0" err="1"/>
+              <a:t>tidak</a:t>
+            </a:r>
+            <a:r>
+              <a:rPr lang="en-US" sz="1100" dirty="0"/>
+              <a:t> </a:t>
+            </a:r>
+            <a:r>
+              <a:rPr lang="en-US" sz="1100" dirty="0" err="1"/>
+              <a:t>diupdate</a:t>
+            </a:r>
+            <a:r>
+              <a:rPr lang="en-US" sz="1100" dirty="0"/>
+              <a:t> </a:t>
+            </a:r>
+            <a:r>
+              <a:rPr lang="en-US" sz="1100" dirty="0" err="1"/>
+              <a:t>menjadikan</a:t>
+            </a:r>
+            <a:r>
+              <a:rPr lang="en-US" sz="1100" dirty="0"/>
+              <a:t> </a:t>
+            </a:r>
+            <a:r>
+              <a:rPr lang="en-US" sz="1100" dirty="0" err="1"/>
+              <a:t>calon</a:t>
+            </a:r>
+            <a:r>
+              <a:rPr lang="en-US" sz="1100" dirty="0"/>
+              <a:t> visitor </a:t>
+            </a:r>
+            <a:r>
+              <a:rPr lang="en-US" sz="1100" dirty="0" err="1"/>
+              <a:t>atau</a:t>
+            </a:r>
+            <a:r>
+              <a:rPr lang="en-US" sz="1100" dirty="0"/>
+              <a:t> customer </a:t>
+            </a:r>
+            <a:r>
+              <a:rPr lang="en-US" sz="1100" dirty="0" err="1"/>
+              <a:t>mengalami</a:t>
+            </a:r>
+            <a:r>
+              <a:rPr lang="en-US" sz="1100" dirty="0"/>
+              <a:t> </a:t>
+            </a:r>
+            <a:r>
+              <a:rPr lang="en-US" sz="1100" dirty="0" err="1"/>
+              <a:t>penurunan</a:t>
+            </a:r>
+            <a:r>
+              <a:rPr lang="en-US" sz="1100" dirty="0"/>
+              <a:t> </a:t>
+            </a:r>
+            <a:r>
+              <a:rPr lang="en-US" sz="1100" dirty="0" err="1"/>
+              <a:t>tingkat</a:t>
+            </a:r>
+            <a:r>
+              <a:rPr lang="en-US" sz="1100" dirty="0"/>
+              <a:t> interest. Hal </a:t>
+            </a:r>
+            <a:r>
+              <a:rPr lang="en-US" sz="1100" dirty="0" err="1"/>
+              <a:t>lainnya</a:t>
+            </a:r>
+            <a:r>
+              <a:rPr lang="en-US" sz="1100" dirty="0"/>
+              <a:t> </a:t>
+            </a:r>
+            <a:r>
+              <a:rPr lang="en-US" sz="1100" dirty="0" err="1"/>
+              <a:t>adalah</a:t>
+            </a:r>
+            <a:r>
+              <a:rPr lang="en-US" sz="1100" dirty="0"/>
+              <a:t> </a:t>
+            </a:r>
+            <a:r>
+              <a:rPr lang="en-US" sz="1100" dirty="0" err="1"/>
+              <a:t>wabah</a:t>
+            </a:r>
+            <a:r>
+              <a:rPr lang="en-US" sz="1100" dirty="0"/>
+              <a:t> covid yang </a:t>
+            </a:r>
+            <a:r>
+              <a:rPr lang="en-US" sz="1100" dirty="0" err="1"/>
+              <a:t>sudah</a:t>
+            </a:r>
+            <a:r>
+              <a:rPr lang="en-US" sz="1100" dirty="0"/>
+              <a:t> </a:t>
+            </a:r>
+            <a:r>
+              <a:rPr lang="en-US" sz="1100" dirty="0" err="1"/>
+              <a:t>menyerang</a:t>
+            </a:r>
+            <a:r>
+              <a:rPr lang="en-US" sz="1100" dirty="0"/>
+              <a:t> negara lain </a:t>
+            </a:r>
+            <a:r>
+              <a:rPr lang="en-US" sz="1100" dirty="0" err="1"/>
+              <a:t>membuat</a:t>
+            </a:r>
+            <a:r>
+              <a:rPr lang="en-US" sz="1100" dirty="0"/>
+              <a:t> </a:t>
+            </a:r>
+            <a:r>
+              <a:rPr lang="en-US" sz="1100" dirty="0" err="1"/>
+              <a:t>banyak</a:t>
+            </a:r>
+            <a:r>
+              <a:rPr lang="en-US" sz="1100" dirty="0"/>
+              <a:t> </a:t>
+            </a:r>
+            <a:r>
+              <a:rPr lang="en-US" sz="1100" dirty="0" err="1"/>
+              <a:t>pihak</a:t>
+            </a:r>
+            <a:r>
+              <a:rPr lang="en-US" sz="1100" dirty="0"/>
+              <a:t> </a:t>
+            </a:r>
+            <a:r>
+              <a:rPr lang="en-US" sz="1100" dirty="0" err="1"/>
+              <a:t>untuk</a:t>
+            </a:r>
+            <a:r>
+              <a:rPr lang="en-US" sz="1100" dirty="0"/>
+              <a:t> </a:t>
+            </a:r>
+            <a:r>
+              <a:rPr lang="en-US" sz="1100" dirty="0" err="1"/>
+              <a:t>lebih</a:t>
+            </a:r>
+            <a:r>
+              <a:rPr lang="en-US" sz="1100" dirty="0"/>
+              <a:t> </a:t>
+            </a:r>
+            <a:r>
+              <a:rPr lang="en-US" sz="1100" dirty="0" err="1"/>
+              <a:t>memilih</a:t>
+            </a:r>
+            <a:r>
+              <a:rPr lang="en-US" sz="1100" dirty="0"/>
+              <a:t> </a:t>
+            </a:r>
+            <a:r>
+              <a:rPr lang="en-US" sz="1100" dirty="0" err="1"/>
+              <a:t>waspada</a:t>
+            </a:r>
+            <a:r>
+              <a:rPr lang="en-US" sz="1100" dirty="0"/>
+              <a:t> </a:t>
+            </a:r>
+            <a:r>
+              <a:rPr lang="en-US" sz="1100" dirty="0" err="1"/>
+              <a:t>dibandingkan</a:t>
+            </a:r>
+            <a:r>
+              <a:rPr lang="en-US" sz="1100" dirty="0"/>
+              <a:t> </a:t>
+            </a:r>
+            <a:r>
+              <a:rPr lang="en-US" sz="1100" dirty="0" err="1"/>
+              <a:t>memesan</a:t>
+            </a:r>
+            <a:r>
+              <a:rPr lang="en-US" sz="1100" dirty="0"/>
+              <a:t> hotel.</a:t>
+            </a:r>
+            <a:endParaRPr lang="en-ID" sz="1100" dirty="0"/>
+          </a:p>
+        </p:txBody>
+      </p:sp>
+      <p:pic>
+        <p:nvPicPr>
+          <p:cNvPr id="11" name="Picture 10">
+            <a:extLst>
+              <a:ext uri="{FF2B5EF4-FFF2-40B4-BE49-F238E27FC236}">
+                <a16:creationId xmlns:a16="http://schemas.microsoft.com/office/drawing/2014/main" id="{8FB2F583-F915-75DD-4281-45D84A6FAFDB}"/>
+              </a:ext>
+            </a:extLst>
+          </p:cNvPr>
+          <p:cNvPicPr>
+            <a:picLocks noChangeAspect="1"/>
+          </p:cNvPicPr>
+          <p:nvPr/>
+        </p:nvPicPr>
+        <p:blipFill>
+          <a:blip r:embed="rId3"/>
+          <a:stretch>
+            <a:fillRect/>
+          </a:stretch>
+        </p:blipFill>
+        <p:spPr>
+          <a:xfrm>
+            <a:off x="3841595" y="0"/>
+            <a:ext cx="5302405" cy="5143500"/>
+          </a:xfrm>
+          <a:prstGeom prst="rect">
+            <a:avLst/>
+          </a:prstGeom>
+        </p:spPr>
+      </p:pic>
+      <p:sp>
+        <p:nvSpPr>
+          <p:cNvPr id="12" name="TextBox 11">
+            <a:extLst>
+              <a:ext uri="{FF2B5EF4-FFF2-40B4-BE49-F238E27FC236}">
+                <a16:creationId xmlns:a16="http://schemas.microsoft.com/office/drawing/2014/main" id="{A676260E-358F-C0DD-D414-CC8E4246083B}"/>
+              </a:ext>
+            </a:extLst>
+          </p:cNvPr>
+          <p:cNvSpPr txBox="1"/>
+          <p:nvPr/>
+        </p:nvSpPr>
+        <p:spPr>
+          <a:xfrm>
+            <a:off x="6337495" y="991772"/>
+            <a:ext cx="2644727" cy="1384995"/>
+          </a:xfrm>
+          <a:prstGeom prst="rect">
+            <a:avLst/>
+          </a:prstGeom>
+          <a:solidFill>
+            <a:srgbClr val="92D050"/>
+          </a:solidFill>
+        </p:spPr>
+        <p:txBody>
+          <a:bodyPr wrap="square" rtlCol="0">
+            <a:spAutoFit/>
+          </a:bodyPr>
+          <a:lstStyle/>
+          <a:p>
+            <a:pPr algn="just"/>
+            <a:r>
+              <a:rPr lang="en-US" dirty="0" err="1"/>
+              <a:t>Pemesanan</a:t>
+            </a:r>
+            <a:r>
+              <a:rPr lang="en-US" dirty="0"/>
+              <a:t> </a:t>
+            </a:r>
+            <a:r>
+              <a:rPr lang="en-US" dirty="0" err="1"/>
+              <a:t>kamar</a:t>
+            </a:r>
+            <a:r>
+              <a:rPr lang="en-US" dirty="0"/>
+              <a:t> hotel paling </a:t>
+            </a:r>
+            <a:r>
+              <a:rPr lang="en-US" dirty="0" err="1"/>
+              <a:t>banyak</a:t>
+            </a:r>
+            <a:r>
+              <a:rPr lang="en-US" dirty="0"/>
+              <a:t> </a:t>
+            </a:r>
+            <a:r>
+              <a:rPr lang="en-US" dirty="0" err="1"/>
+              <a:t>terjadi</a:t>
+            </a:r>
+            <a:r>
+              <a:rPr lang="en-US" dirty="0"/>
+              <a:t> di </a:t>
+            </a:r>
+            <a:r>
+              <a:rPr lang="en-US" dirty="0" err="1"/>
+              <a:t>tahun</a:t>
+            </a:r>
+            <a:r>
+              <a:rPr lang="en-US" dirty="0"/>
+              <a:t> 2018 </a:t>
+            </a:r>
+            <a:r>
+              <a:rPr lang="en-US" dirty="0" err="1"/>
+              <a:t>adalah</a:t>
+            </a:r>
+            <a:r>
+              <a:rPr lang="en-US" dirty="0"/>
+              <a:t> di </a:t>
+            </a:r>
+            <a:r>
+              <a:rPr lang="en-US" dirty="0" err="1"/>
+              <a:t>bulan</a:t>
+            </a:r>
+            <a:r>
+              <a:rPr lang="en-US" dirty="0"/>
+              <a:t> </a:t>
+            </a:r>
+            <a:r>
+              <a:rPr lang="en-US" dirty="0" err="1"/>
+              <a:t>Desember</a:t>
+            </a:r>
+            <a:r>
+              <a:rPr lang="en-US" dirty="0"/>
+              <a:t>. Hal </a:t>
+            </a:r>
+            <a:r>
+              <a:rPr lang="en-US" dirty="0" err="1"/>
+              <a:t>ini</a:t>
+            </a:r>
+            <a:r>
+              <a:rPr lang="en-US" dirty="0"/>
+              <a:t> sangat </a:t>
+            </a:r>
+            <a:r>
+              <a:rPr lang="en-US" dirty="0" err="1"/>
+              <a:t>wajar</a:t>
+            </a:r>
+            <a:r>
+              <a:rPr lang="en-US" dirty="0"/>
+              <a:t> </a:t>
+            </a:r>
+            <a:r>
+              <a:rPr lang="en-US" dirty="0" err="1"/>
+              <a:t>karena</a:t>
+            </a:r>
+            <a:r>
+              <a:rPr lang="en-US" dirty="0"/>
+              <a:t> </a:t>
+            </a:r>
+            <a:r>
+              <a:rPr lang="en-US" dirty="0" err="1"/>
+              <a:t>ada</a:t>
+            </a:r>
+            <a:r>
+              <a:rPr lang="en-US" dirty="0"/>
+              <a:t> </a:t>
+            </a:r>
+            <a:r>
+              <a:rPr lang="en-US" dirty="0" err="1"/>
+              <a:t>hari</a:t>
+            </a:r>
+            <a:r>
+              <a:rPr lang="en-US" dirty="0"/>
+              <a:t> </a:t>
+            </a:r>
+            <a:r>
+              <a:rPr lang="en-US" dirty="0" err="1"/>
+              <a:t>besar</a:t>
+            </a:r>
+            <a:r>
+              <a:rPr lang="en-US" dirty="0"/>
+              <a:t> </a:t>
+            </a:r>
+            <a:r>
+              <a:rPr lang="en-US" dirty="0" err="1"/>
+              <a:t>seperti</a:t>
+            </a:r>
+            <a:r>
+              <a:rPr lang="en-US" dirty="0"/>
+              <a:t> Natal dan </a:t>
+            </a:r>
+            <a:r>
+              <a:rPr lang="en-US" dirty="0" err="1"/>
+              <a:t>Tahun</a:t>
+            </a:r>
+            <a:r>
+              <a:rPr lang="en-US" dirty="0"/>
+              <a:t> </a:t>
+            </a:r>
+            <a:r>
+              <a:rPr lang="en-US" dirty="0" err="1"/>
+              <a:t>Baru</a:t>
+            </a:r>
+            <a:endParaRPr lang="en-ID" dirty="0"/>
+          </a:p>
+        </p:txBody>
+      </p:sp>
+    </p:spTree>
+    <p:extLst>
+      <p:ext uri="{BB962C8B-B14F-4D97-AF65-F5344CB8AC3E}">
+        <p14:creationId xmlns:p14="http://schemas.microsoft.com/office/powerpoint/2010/main" val="3926026498"/>
+      </p:ext>
+    </p:extLst>
+  </p:cSld>
+  <p:clrMapOvr>
+    <a:masterClrMapping/>
+  </p:clrMapOvr>
+</p:sld>
+</file>
+
+<file path=ppt/slides/slide5.xml><?xml version="1.0" encoding="utf-8"?>
+<p:sld xmlns:a="http://schemas.openxmlformats.org/drawingml/2006/main" xmlns:r="http://schemas.openxmlformats.org/officeDocument/2006/relationships" xmlns:p="http://schemas.openxmlformats.org/presentationml/2006/main">
+  <p:cSld>
+    <p:spTree>
+      <p:nvGrpSpPr>
+        <p:cNvPr id="1" name=""/>
+        <p:cNvGrpSpPr/>
+        <p:nvPr/>
+      </p:nvGrpSpPr>
+      <p:grpSpPr>
+        <a:xfrm>
+          <a:off x="0" y="0"/>
+          <a:ext cx="0" cy="0"/>
+          <a:chOff x="0" y="0"/>
+          <a:chExt cx="0" cy="0"/>
+        </a:xfrm>
+      </p:grpSpPr>
+      <p:sp>
+        <p:nvSpPr>
+          <p:cNvPr id="2" name="Title 1">
+            <a:extLst>
+              <a:ext uri="{FF2B5EF4-FFF2-40B4-BE49-F238E27FC236}">
+                <a16:creationId xmlns:a16="http://schemas.microsoft.com/office/drawing/2014/main" id="{9A5DCE19-FF5F-9D38-676F-009DF07510FC}"/>
+              </a:ext>
+            </a:extLst>
+          </p:cNvPr>
+          <p:cNvSpPr>
+            <a:spLocks noGrp="1"/>
+          </p:cNvSpPr>
+          <p:nvPr>
+            <p:ph type="title"/>
+          </p:nvPr>
+        </p:nvSpPr>
+        <p:spPr/>
+        <p:txBody>
+          <a:bodyPr/>
+          <a:lstStyle/>
+          <a:p>
+            <a:endParaRPr lang="en-ID"/>
+          </a:p>
+        </p:txBody>
+      </p:sp>
+      <p:pic>
+        <p:nvPicPr>
+          <p:cNvPr id="5" name="Picture 4">
+            <a:extLst>
+              <a:ext uri="{FF2B5EF4-FFF2-40B4-BE49-F238E27FC236}">
+                <a16:creationId xmlns:a16="http://schemas.microsoft.com/office/drawing/2014/main" id="{D3E531A6-C677-ED8F-6F97-F7E4546EC35A}"/>
+              </a:ext>
+            </a:extLst>
+          </p:cNvPr>
+          <p:cNvPicPr>
+            <a:picLocks noChangeAspect="1"/>
+          </p:cNvPicPr>
+          <p:nvPr/>
+        </p:nvPicPr>
+        <p:blipFill>
+          <a:blip r:embed="rId2"/>
+          <a:stretch>
+            <a:fillRect/>
+          </a:stretch>
+        </p:blipFill>
+        <p:spPr>
+          <a:xfrm>
+            <a:off x="0" y="1064455"/>
+            <a:ext cx="4981575" cy="3619500"/>
+          </a:xfrm>
+          <a:prstGeom prst="rect">
+            <a:avLst/>
+          </a:prstGeom>
+        </p:spPr>
+      </p:pic>
+      <p:sp>
+        <p:nvSpPr>
+          <p:cNvPr id="6" name="TextBox 5">
+            <a:extLst>
+              <a:ext uri="{FF2B5EF4-FFF2-40B4-BE49-F238E27FC236}">
+                <a16:creationId xmlns:a16="http://schemas.microsoft.com/office/drawing/2014/main" id="{7C708C0F-887C-A92A-001D-1F3B858B09D4}"/>
+              </a:ext>
+            </a:extLst>
+          </p:cNvPr>
+          <p:cNvSpPr txBox="1"/>
+          <p:nvPr/>
+        </p:nvSpPr>
+        <p:spPr>
+          <a:xfrm>
+            <a:off x="5254283" y="1448972"/>
+            <a:ext cx="3530991" cy="1384995"/>
+          </a:xfrm>
+          <a:prstGeom prst="rect">
+            <a:avLst/>
+          </a:prstGeom>
+          <a:noFill/>
+        </p:spPr>
+        <p:txBody>
+          <a:bodyPr wrap="square" rtlCol="0">
+            <a:spAutoFit/>
+          </a:bodyPr>
+          <a:lstStyle/>
+          <a:p>
+            <a:pPr algn="just"/>
+            <a:r>
+              <a:rPr lang="en-US" dirty="0"/>
+              <a:t>Dari </a:t>
+            </a:r>
+            <a:r>
+              <a:rPr lang="en-US" dirty="0" err="1"/>
+              <a:t>tahun</a:t>
+            </a:r>
+            <a:r>
+              <a:rPr lang="en-US" dirty="0"/>
+              <a:t> 2017 </a:t>
+            </a:r>
+            <a:r>
+              <a:rPr lang="en-US" dirty="0" err="1"/>
+              <a:t>hingga</a:t>
+            </a:r>
+            <a:r>
+              <a:rPr lang="en-US" dirty="0"/>
+              <a:t> 2019, para </a:t>
+            </a:r>
+            <a:r>
+              <a:rPr lang="en-US" dirty="0" err="1"/>
+              <a:t>pengunjung</a:t>
+            </a:r>
+            <a:r>
+              <a:rPr lang="en-US" dirty="0"/>
+              <a:t> yang </a:t>
+            </a:r>
+            <a:r>
+              <a:rPr lang="en-US" dirty="0" err="1"/>
+              <a:t>memesan</a:t>
+            </a:r>
+            <a:r>
+              <a:rPr lang="en-US" dirty="0"/>
+              <a:t> hotel </a:t>
+            </a:r>
+            <a:r>
+              <a:rPr lang="en-US" dirty="0" err="1"/>
+              <a:t>kebanyakan</a:t>
+            </a:r>
+            <a:r>
+              <a:rPr lang="en-US" dirty="0"/>
+              <a:t> </a:t>
+            </a:r>
+            <a:r>
+              <a:rPr lang="en-US" dirty="0" err="1"/>
+              <a:t>memesan</a:t>
+            </a:r>
+            <a:r>
+              <a:rPr lang="en-US" dirty="0"/>
+              <a:t> di </a:t>
+            </a:r>
+            <a:r>
+              <a:rPr lang="en-US" dirty="0" err="1"/>
+              <a:t>pertengahan</a:t>
+            </a:r>
+            <a:r>
+              <a:rPr lang="en-US" dirty="0"/>
+              <a:t> </a:t>
+            </a:r>
+            <a:r>
+              <a:rPr lang="en-US" dirty="0" err="1"/>
+              <a:t>tahun</a:t>
+            </a:r>
+            <a:r>
+              <a:rPr lang="en-US" dirty="0"/>
+              <a:t>. Hal </a:t>
+            </a:r>
+            <a:r>
+              <a:rPr lang="en-US" dirty="0" err="1"/>
+              <a:t>ini</a:t>
+            </a:r>
+            <a:r>
+              <a:rPr lang="en-US" dirty="0"/>
+              <a:t> </a:t>
+            </a:r>
+            <a:r>
+              <a:rPr lang="en-US" dirty="0" err="1"/>
+              <a:t>terjadi</a:t>
+            </a:r>
+            <a:r>
+              <a:rPr lang="en-US" dirty="0"/>
+              <a:t> </a:t>
+            </a:r>
+            <a:r>
+              <a:rPr lang="en-US" dirty="0" err="1"/>
+              <a:t>karena</a:t>
+            </a:r>
+            <a:r>
+              <a:rPr lang="en-US" dirty="0"/>
+              <a:t> </a:t>
+            </a:r>
+            <a:r>
+              <a:rPr lang="en-US" dirty="0" err="1"/>
+              <a:t>adanya</a:t>
+            </a:r>
+            <a:r>
+              <a:rPr lang="en-US" dirty="0"/>
+              <a:t> </a:t>
+            </a:r>
+            <a:r>
+              <a:rPr lang="en-US" dirty="0" err="1"/>
+              <a:t>libur</a:t>
+            </a:r>
+            <a:r>
+              <a:rPr lang="en-US" dirty="0"/>
+              <a:t> </a:t>
+            </a:r>
+            <a:r>
+              <a:rPr lang="en-US" dirty="0" err="1"/>
+              <a:t>sekolah</a:t>
+            </a:r>
+            <a:r>
+              <a:rPr lang="en-US" dirty="0"/>
+              <a:t>, </a:t>
+            </a:r>
+            <a:r>
+              <a:rPr lang="en-US" dirty="0" err="1"/>
+              <a:t>libur</a:t>
+            </a:r>
+            <a:r>
+              <a:rPr lang="en-US" dirty="0"/>
+              <a:t> </a:t>
+            </a:r>
+            <a:r>
+              <a:rPr lang="en-US" dirty="0" err="1"/>
+              <a:t>lebaran</a:t>
+            </a:r>
+            <a:r>
+              <a:rPr lang="en-US" dirty="0"/>
+              <a:t>, dan </a:t>
+            </a:r>
+            <a:r>
+              <a:rPr lang="en-US" dirty="0" err="1"/>
+              <a:t>beberapa</a:t>
+            </a:r>
+            <a:r>
+              <a:rPr lang="en-US" dirty="0"/>
+              <a:t> </a:t>
+            </a:r>
+            <a:r>
+              <a:rPr lang="en-US" dirty="0" err="1"/>
+              <a:t>pekerjaan</a:t>
+            </a:r>
+            <a:r>
+              <a:rPr lang="en-US" dirty="0"/>
+              <a:t> </a:t>
+            </a:r>
+            <a:r>
+              <a:rPr lang="en-US" dirty="0" err="1"/>
+              <a:t>lainnya</a:t>
+            </a:r>
+            <a:r>
+              <a:rPr lang="en-US" dirty="0"/>
+              <a:t>. </a:t>
+            </a:r>
+            <a:endParaRPr lang="en-ID" dirty="0"/>
+          </a:p>
+        </p:txBody>
+      </p:sp>
+    </p:spTree>
+    <p:extLst>
+      <p:ext uri="{BB962C8B-B14F-4D97-AF65-F5344CB8AC3E}">
+        <p14:creationId xmlns:p14="http://schemas.microsoft.com/office/powerpoint/2010/main" val="863945501"/>
+      </p:ext>
+    </p:extLst>
   </p:cSld>
   <p:clrMapOvr>
     <a:masterClrMapping/>

</xml_diff>

<commit_message>
Edit file code, file Readme, dan file ppt
</commit_message>
<xml_diff>
--- a/Hotel_Bussiness.pptx
+++ b/Hotel_Bussiness.pptx
@@ -6,7 +6,7 @@
     <p:sldMasterId id="2147483671" r:id="rId2"/>
   </p:sldMasterIdLst>
   <p:notesMasterIdLst>
-    <p:notesMasterId r:id="rId8"/>
+    <p:notesMasterId r:id="rId9"/>
   </p:notesMasterIdLst>
   <p:sldIdLst>
     <p:sldId id="256" r:id="rId3"/>
@@ -14,21 +14,22 @@
     <p:sldId id="258" r:id="rId5"/>
     <p:sldId id="259" r:id="rId6"/>
     <p:sldId id="260" r:id="rId7"/>
+    <p:sldId id="261" r:id="rId8"/>
   </p:sldIdLst>
   <p:sldSz cx="9144000" cy="5143500" type="screen16x9"/>
   <p:notesSz cx="6858000" cy="9144000"/>
   <p:embeddedFontLst>
     <p:embeddedFont>
       <p:font typeface="Dosis" pitchFamily="2" charset="0"/>
-      <p:regular r:id="rId9"/>
-      <p:bold r:id="rId10"/>
+      <p:regular r:id="rId10"/>
+      <p:bold r:id="rId11"/>
     </p:embeddedFont>
     <p:embeddedFont>
       <p:font typeface="Roboto" panose="02000000000000000000" pitchFamily="2" charset="0"/>
-      <p:regular r:id="rId11"/>
-      <p:bold r:id="rId12"/>
-      <p:italic r:id="rId13"/>
-      <p:boldItalic r:id="rId14"/>
+      <p:regular r:id="rId12"/>
+      <p:bold r:id="rId13"/>
+      <p:italic r:id="rId14"/>
+      <p:boldItalic r:id="rId15"/>
     </p:embeddedFont>
   </p:embeddedFontLst>
   <p:defaultTextStyle>
@@ -14178,6 +14179,467 @@
     <p:extLst>
       <p:ext uri="{BB962C8B-B14F-4D97-AF65-F5344CB8AC3E}">
         <p14:creationId xmlns:p14="http://schemas.microsoft.com/office/powerpoint/2010/main" val="863945501"/>
+      </p:ext>
+    </p:extLst>
+  </p:cSld>
+  <p:clrMapOvr>
+    <a:masterClrMapping/>
+  </p:clrMapOvr>
+</p:sld>
+</file>
+
+<file path=ppt/slides/slide6.xml><?xml version="1.0" encoding="utf-8"?>
+<p:sld xmlns:a="http://schemas.openxmlformats.org/drawingml/2006/main" xmlns:r="http://schemas.openxmlformats.org/officeDocument/2006/relationships" xmlns:p="http://schemas.openxmlformats.org/presentationml/2006/main">
+  <p:cSld>
+    <p:spTree>
+      <p:nvGrpSpPr>
+        <p:cNvPr id="1" name=""/>
+        <p:cNvGrpSpPr/>
+        <p:nvPr/>
+      </p:nvGrpSpPr>
+      <p:grpSpPr>
+        <a:xfrm>
+          <a:off x="0" y="0"/>
+          <a:ext cx="0" cy="0"/>
+          <a:chOff x="0" y="0"/>
+          <a:chExt cx="0" cy="0"/>
+        </a:xfrm>
+      </p:grpSpPr>
+      <p:sp>
+        <p:nvSpPr>
+          <p:cNvPr id="2" name="Title 1">
+            <a:extLst>
+              <a:ext uri="{FF2B5EF4-FFF2-40B4-BE49-F238E27FC236}">
+                <a16:creationId xmlns:a16="http://schemas.microsoft.com/office/drawing/2014/main" id="{5AB90DDD-1AE4-260D-A295-6BB0B9457F52}"/>
+              </a:ext>
+            </a:extLst>
+          </p:cNvPr>
+          <p:cNvSpPr>
+            <a:spLocks noGrp="1"/>
+          </p:cNvSpPr>
+          <p:nvPr>
+            <p:ph type="title"/>
+          </p:nvPr>
+        </p:nvSpPr>
+        <p:spPr/>
+        <p:txBody>
+          <a:bodyPr/>
+          <a:lstStyle/>
+          <a:p>
+            <a:endParaRPr lang="en-ID"/>
+          </a:p>
+        </p:txBody>
+      </p:sp>
+      <p:pic>
+        <p:nvPicPr>
+          <p:cNvPr id="8" name="Picture 7">
+            <a:extLst>
+              <a:ext uri="{FF2B5EF4-FFF2-40B4-BE49-F238E27FC236}">
+                <a16:creationId xmlns:a16="http://schemas.microsoft.com/office/drawing/2014/main" id="{6C3191AF-9F39-D449-14EB-6EAC62F365FF}"/>
+              </a:ext>
+            </a:extLst>
+          </p:cNvPr>
+          <p:cNvPicPr>
+            <a:picLocks noChangeAspect="1"/>
+          </p:cNvPicPr>
+          <p:nvPr/>
+        </p:nvPicPr>
+        <p:blipFill>
+          <a:blip r:embed="rId2"/>
+          <a:stretch>
+            <a:fillRect/>
+          </a:stretch>
+        </p:blipFill>
+        <p:spPr>
+          <a:xfrm>
+            <a:off x="0" y="530860"/>
+            <a:ext cx="4790049" cy="4612640"/>
+          </a:xfrm>
+          <a:prstGeom prst="rect">
+            <a:avLst/>
+          </a:prstGeom>
+        </p:spPr>
+      </p:pic>
+      <p:sp>
+        <p:nvSpPr>
+          <p:cNvPr id="9" name="TextBox 8">
+            <a:extLst>
+              <a:ext uri="{FF2B5EF4-FFF2-40B4-BE49-F238E27FC236}">
+                <a16:creationId xmlns:a16="http://schemas.microsoft.com/office/drawing/2014/main" id="{6354E274-9E47-D48A-83A2-578DF442C061}"/>
+              </a:ext>
+            </a:extLst>
+          </p:cNvPr>
+          <p:cNvSpPr txBox="1"/>
+          <p:nvPr/>
+        </p:nvSpPr>
+        <p:spPr>
+          <a:xfrm>
+            <a:off x="5099538" y="865163"/>
+            <a:ext cx="3931920" cy="2677656"/>
+          </a:xfrm>
+          <a:prstGeom prst="rect">
+            <a:avLst/>
+          </a:prstGeom>
+          <a:noFill/>
+        </p:spPr>
+        <p:txBody>
+          <a:bodyPr wrap="square" rtlCol="0">
+            <a:spAutoFit/>
+          </a:bodyPr>
+          <a:lstStyle/>
+          <a:p>
+            <a:pPr algn="just"/>
+            <a:r>
+              <a:rPr lang="en-US" dirty="0"/>
+              <a:t>Gambar di </a:t>
+            </a:r>
+            <a:r>
+              <a:rPr lang="en-US" dirty="0" err="1"/>
+              <a:t>samping</a:t>
+            </a:r>
+            <a:r>
+              <a:rPr lang="en-US" dirty="0"/>
+              <a:t> </a:t>
+            </a:r>
+            <a:r>
+              <a:rPr lang="en-US" dirty="0" err="1"/>
+              <a:t>merupakan</a:t>
+            </a:r>
+            <a:r>
+              <a:rPr lang="en-US" dirty="0"/>
+              <a:t> </a:t>
+            </a:r>
+            <a:r>
+              <a:rPr lang="en-US" dirty="0" err="1"/>
+              <a:t>hubungan</a:t>
+            </a:r>
+            <a:r>
+              <a:rPr lang="en-US" dirty="0"/>
+              <a:t> </a:t>
+            </a:r>
+            <a:r>
+              <a:rPr lang="en-US" dirty="0" err="1"/>
+              <a:t>antara</a:t>
+            </a:r>
+            <a:r>
+              <a:rPr lang="en-US" dirty="0"/>
+              <a:t> total stay (</a:t>
+            </a:r>
+            <a:r>
+              <a:rPr lang="en-US" dirty="0" err="1"/>
+              <a:t>jumlah</a:t>
+            </a:r>
+            <a:r>
+              <a:rPr lang="en-US" dirty="0"/>
+              <a:t> </a:t>
+            </a:r>
+            <a:r>
+              <a:rPr lang="en-US" dirty="0" err="1"/>
+              <a:t>hari</a:t>
+            </a:r>
+            <a:r>
+              <a:rPr lang="en-US" dirty="0"/>
+              <a:t> </a:t>
+            </a:r>
+            <a:r>
+              <a:rPr lang="en-US" dirty="0" err="1"/>
+              <a:t>menginap</a:t>
+            </a:r>
+            <a:r>
+              <a:rPr lang="en-US" dirty="0"/>
+              <a:t>) dan ratio cancel (</a:t>
+            </a:r>
+            <a:r>
+              <a:rPr lang="en-US" dirty="0" err="1"/>
+              <a:t>jumlah</a:t>
+            </a:r>
+            <a:r>
+              <a:rPr lang="en-US" dirty="0"/>
+              <a:t> cancel </a:t>
+            </a:r>
+            <a:r>
+              <a:rPr lang="en-US" dirty="0" err="1"/>
+              <a:t>dibagi</a:t>
+            </a:r>
+            <a:r>
+              <a:rPr lang="en-US" dirty="0"/>
+              <a:t> total booking).</a:t>
+            </a:r>
+          </a:p>
+          <a:p>
+            <a:pPr algn="just"/>
+            <a:endParaRPr lang="en-US" dirty="0"/>
+          </a:p>
+          <a:p>
+            <a:pPr algn="just"/>
+            <a:r>
+              <a:rPr lang="en-US" dirty="0"/>
+              <a:t>Dari </a:t>
+            </a:r>
+            <a:r>
+              <a:rPr lang="en-US" dirty="0" err="1"/>
+              <a:t>gambar</a:t>
+            </a:r>
+            <a:r>
+              <a:rPr lang="en-US" dirty="0"/>
+              <a:t> </a:t>
+            </a:r>
+            <a:r>
+              <a:rPr lang="en-US" dirty="0" err="1"/>
+              <a:t>tersebut</a:t>
+            </a:r>
+            <a:r>
+              <a:rPr lang="en-US" dirty="0"/>
+              <a:t> </a:t>
+            </a:r>
+            <a:r>
+              <a:rPr lang="en-US" dirty="0" err="1"/>
+              <a:t>diperoleh</a:t>
+            </a:r>
+            <a:r>
+              <a:rPr lang="en-US" dirty="0"/>
+              <a:t> </a:t>
+            </a:r>
+            <a:r>
+              <a:rPr lang="en-US" dirty="0" err="1"/>
+              <a:t>informasi</a:t>
+            </a:r>
+            <a:r>
+              <a:rPr lang="en-US" dirty="0"/>
+              <a:t> </a:t>
+            </a:r>
+            <a:r>
+              <a:rPr lang="en-US" dirty="0" err="1"/>
+              <a:t>bahwa</a:t>
+            </a:r>
+            <a:r>
+              <a:rPr lang="en-US" dirty="0"/>
+              <a:t> </a:t>
+            </a:r>
+            <a:r>
+              <a:rPr lang="en-US" dirty="0" err="1"/>
+              <a:t>tidak</a:t>
+            </a:r>
+            <a:r>
+              <a:rPr lang="en-US" dirty="0"/>
+              <a:t> </a:t>
+            </a:r>
+            <a:r>
+              <a:rPr lang="en-US" dirty="0" err="1"/>
+              <a:t>adanya</a:t>
+            </a:r>
+            <a:r>
+              <a:rPr lang="en-US" dirty="0"/>
+              <a:t> </a:t>
+            </a:r>
+            <a:r>
+              <a:rPr lang="en-US" dirty="0" err="1"/>
+              <a:t>relasi</a:t>
+            </a:r>
+            <a:r>
+              <a:rPr lang="en-US" dirty="0"/>
+              <a:t> </a:t>
+            </a:r>
+            <a:r>
+              <a:rPr lang="en-US" dirty="0" err="1"/>
+              <a:t>antar</a:t>
+            </a:r>
+            <a:r>
+              <a:rPr lang="en-US" dirty="0"/>
+              <a:t> </a:t>
+            </a:r>
+            <a:r>
+              <a:rPr lang="en-US" dirty="0" err="1"/>
+              <a:t>kedua</a:t>
+            </a:r>
+            <a:r>
+              <a:rPr lang="en-US" dirty="0"/>
+              <a:t> </a:t>
+            </a:r>
+            <a:r>
+              <a:rPr lang="en-US" dirty="0" err="1"/>
+              <a:t>fitur</a:t>
+            </a:r>
+            <a:r>
+              <a:rPr lang="en-US" dirty="0"/>
+              <a:t> </a:t>
+            </a:r>
+            <a:r>
+              <a:rPr lang="en-US" dirty="0" err="1"/>
+              <a:t>tersebut</a:t>
+            </a:r>
+            <a:r>
+              <a:rPr lang="en-US" dirty="0"/>
+              <a:t>. </a:t>
+            </a:r>
+            <a:r>
+              <a:rPr lang="en-US" dirty="0" err="1"/>
+              <a:t>Namun</a:t>
+            </a:r>
+            <a:r>
+              <a:rPr lang="en-US" dirty="0"/>
+              <a:t> </a:t>
+            </a:r>
+            <a:r>
+              <a:rPr lang="en-US" dirty="0" err="1"/>
+              <a:t>secara</a:t>
+            </a:r>
+            <a:r>
+              <a:rPr lang="en-US" dirty="0"/>
+              <a:t> </a:t>
+            </a:r>
+            <a:r>
+              <a:rPr lang="en-US" dirty="0" err="1"/>
+              <a:t>implisit</a:t>
+            </a:r>
+            <a:r>
+              <a:rPr lang="en-US" dirty="0"/>
+              <a:t> </a:t>
+            </a:r>
+            <a:r>
+              <a:rPr lang="en-US" dirty="0" err="1"/>
+              <a:t>bahwa</a:t>
+            </a:r>
+            <a:r>
+              <a:rPr lang="en-US" dirty="0"/>
+              <a:t> </a:t>
+            </a:r>
+            <a:r>
+              <a:rPr lang="en-US" dirty="0" err="1"/>
+              <a:t>durasi</a:t>
+            </a:r>
+            <a:r>
+              <a:rPr lang="en-US" dirty="0"/>
+              <a:t> </a:t>
+            </a:r>
+            <a:r>
+              <a:rPr lang="en-US" dirty="0" err="1"/>
+              <a:t>menginap</a:t>
+            </a:r>
+            <a:r>
+              <a:rPr lang="en-US" dirty="0"/>
+              <a:t> </a:t>
+            </a:r>
+            <a:r>
+              <a:rPr lang="en-US" dirty="0" err="1"/>
+              <a:t>dapat</a:t>
+            </a:r>
+            <a:r>
+              <a:rPr lang="en-US" dirty="0"/>
+              <a:t> </a:t>
+            </a:r>
+            <a:r>
+              <a:rPr lang="en-US" dirty="0" err="1"/>
+              <a:t>memengaruhi</a:t>
+            </a:r>
+            <a:r>
+              <a:rPr lang="en-US" dirty="0"/>
+              <a:t> </a:t>
+            </a:r>
+            <a:r>
+              <a:rPr lang="en-US" dirty="0" err="1"/>
+              <a:t>tingkat</a:t>
+            </a:r>
+            <a:r>
+              <a:rPr lang="en-US" dirty="0"/>
+              <a:t> cancel </a:t>
+            </a:r>
+            <a:r>
+              <a:rPr lang="en-US" dirty="0" err="1"/>
+              <a:t>apabila</a:t>
+            </a:r>
+            <a:r>
+              <a:rPr lang="en-US" dirty="0"/>
+              <a:t> </a:t>
+            </a:r>
+            <a:r>
+              <a:rPr lang="en-US" dirty="0" err="1"/>
+              <a:t>sarana</a:t>
+            </a:r>
+            <a:r>
+              <a:rPr lang="en-US" dirty="0"/>
+              <a:t> </a:t>
+            </a:r>
+            <a:r>
+              <a:rPr lang="en-US" dirty="0" err="1"/>
+              <a:t>kurang</a:t>
+            </a:r>
+            <a:r>
+              <a:rPr lang="en-US" dirty="0"/>
+              <a:t> </a:t>
+            </a:r>
+            <a:r>
+              <a:rPr lang="en-US" dirty="0" err="1"/>
+              <a:t>baik</a:t>
+            </a:r>
+            <a:r>
+              <a:rPr lang="en-US" dirty="0"/>
+              <a:t>, service dan </a:t>
+            </a:r>
+            <a:r>
+              <a:rPr lang="en-US" dirty="0" err="1"/>
+              <a:t>perilaku</a:t>
+            </a:r>
+            <a:r>
+              <a:rPr lang="en-US" dirty="0"/>
+              <a:t> </a:t>
+            </a:r>
+            <a:r>
+              <a:rPr lang="en-US" dirty="0" err="1"/>
+              <a:t>warga</a:t>
+            </a:r>
+            <a:r>
+              <a:rPr lang="en-US" dirty="0"/>
+              <a:t> hotel </a:t>
+            </a:r>
+            <a:r>
+              <a:rPr lang="en-US" dirty="0" err="1"/>
+              <a:t>baik</a:t>
+            </a:r>
+            <a:r>
+              <a:rPr lang="en-US" dirty="0"/>
+              <a:t> </a:t>
+            </a:r>
+            <a:r>
+              <a:rPr lang="en-US" dirty="0" err="1"/>
+              <a:t>petugas</a:t>
+            </a:r>
+            <a:r>
+              <a:rPr lang="en-US" dirty="0"/>
+              <a:t> dan </a:t>
+            </a:r>
+            <a:r>
+              <a:rPr lang="en-US" dirty="0" err="1"/>
+              <a:t>tetangga</a:t>
+            </a:r>
+            <a:r>
+              <a:rPr lang="en-US" dirty="0"/>
+              <a:t> </a:t>
+            </a:r>
+            <a:r>
+              <a:rPr lang="en-US" dirty="0" err="1"/>
+              <a:t>kurang</a:t>
+            </a:r>
+            <a:r>
+              <a:rPr lang="en-US" dirty="0"/>
+              <a:t> </a:t>
+            </a:r>
+            <a:r>
+              <a:rPr lang="en-US" dirty="0" err="1"/>
+              <a:t>baik</a:t>
+            </a:r>
+            <a:r>
+              <a:rPr lang="en-US"/>
+              <a:t>.</a:t>
+            </a:r>
+            <a:endParaRPr lang="en-ID" dirty="0"/>
+          </a:p>
+        </p:txBody>
+      </p:sp>
+    </p:spTree>
+    <p:extLst>
+      <p:ext uri="{BB962C8B-B14F-4D97-AF65-F5344CB8AC3E}">
+        <p14:creationId xmlns:p14="http://schemas.microsoft.com/office/powerpoint/2010/main" val="2361187835"/>
       </p:ext>
     </p:extLst>
   </p:cSld>

</xml_diff>

<commit_message>
Edit file code, file readme, file ppt
</commit_message>
<xml_diff>
--- a/Hotel_Bussiness.pptx
+++ b/Hotel_Bussiness.pptx
@@ -6,7 +6,7 @@
     <p:sldMasterId id="2147483671" r:id="rId2"/>
   </p:sldMasterIdLst>
   <p:notesMasterIdLst>
-    <p:notesMasterId r:id="rId9"/>
+    <p:notesMasterId r:id="rId10"/>
   </p:notesMasterIdLst>
   <p:sldIdLst>
     <p:sldId id="256" r:id="rId3"/>
@@ -15,21 +15,22 @@
     <p:sldId id="259" r:id="rId6"/>
     <p:sldId id="260" r:id="rId7"/>
     <p:sldId id="261" r:id="rId8"/>
+    <p:sldId id="262" r:id="rId9"/>
   </p:sldIdLst>
   <p:sldSz cx="9144000" cy="5143500" type="screen16x9"/>
   <p:notesSz cx="6858000" cy="9144000"/>
   <p:embeddedFontLst>
     <p:embeddedFont>
       <p:font typeface="Dosis" pitchFamily="2" charset="0"/>
-      <p:regular r:id="rId10"/>
-      <p:bold r:id="rId11"/>
+      <p:regular r:id="rId11"/>
+      <p:bold r:id="rId12"/>
     </p:embeddedFont>
     <p:embeddedFont>
       <p:font typeface="Roboto" panose="02000000000000000000" pitchFamily="2" charset="0"/>
-      <p:regular r:id="rId12"/>
-      <p:bold r:id="rId13"/>
-      <p:italic r:id="rId14"/>
-      <p:boldItalic r:id="rId15"/>
+      <p:regular r:id="rId13"/>
+      <p:bold r:id="rId14"/>
+      <p:italic r:id="rId15"/>
+      <p:boldItalic r:id="rId16"/>
     </p:embeddedFont>
   </p:embeddedFontLst>
   <p:defaultTextStyle>
@@ -13586,7 +13587,15 @@
             </a:r>
             <a:r>
               <a:rPr lang="en-US" sz="1100" dirty="0"/>
-              <a:t> interest. Hal </a:t>
+              <a:t> interest di </a:t>
+            </a:r>
+            <a:r>
+              <a:rPr lang="en-US" sz="1100" dirty="0" err="1"/>
+              <a:t>tahun</a:t>
+            </a:r>
+            <a:r>
+              <a:rPr lang="en-US" sz="1100" dirty="0"/>
+              <a:t> 2019. Hal </a:t>
             </a:r>
             <a:r>
               <a:rPr lang="en-US" sz="1100" dirty="0" err="1"/>
@@ -14629,7 +14638,7 @@
               <a:t>baik</a:t>
             </a:r>
             <a:r>
-              <a:rPr lang="en-US"/>
+              <a:rPr lang="en-US" dirty="0"/>
               <a:t>.</a:t>
             </a:r>
             <a:endParaRPr lang="en-ID" dirty="0"/>
@@ -14640,6 +14649,423 @@
     <p:extLst>
       <p:ext uri="{BB962C8B-B14F-4D97-AF65-F5344CB8AC3E}">
         <p14:creationId xmlns:p14="http://schemas.microsoft.com/office/powerpoint/2010/main" val="2361187835"/>
+      </p:ext>
+    </p:extLst>
+  </p:cSld>
+  <p:clrMapOvr>
+    <a:masterClrMapping/>
+  </p:clrMapOvr>
+</p:sld>
+</file>
+
+<file path=ppt/slides/slide7.xml><?xml version="1.0" encoding="utf-8"?>
+<p:sld xmlns:a="http://schemas.openxmlformats.org/drawingml/2006/main" xmlns:r="http://schemas.openxmlformats.org/officeDocument/2006/relationships" xmlns:p="http://schemas.openxmlformats.org/presentationml/2006/main">
+  <p:cSld>
+    <p:spTree>
+      <p:nvGrpSpPr>
+        <p:cNvPr id="1" name=""/>
+        <p:cNvGrpSpPr/>
+        <p:nvPr/>
+      </p:nvGrpSpPr>
+      <p:grpSpPr>
+        <a:xfrm>
+          <a:off x="0" y="0"/>
+          <a:ext cx="0" cy="0"/>
+          <a:chOff x="0" y="0"/>
+          <a:chExt cx="0" cy="0"/>
+        </a:xfrm>
+      </p:grpSpPr>
+      <p:sp>
+        <p:nvSpPr>
+          <p:cNvPr id="2" name="Title 1">
+            <a:extLst>
+              <a:ext uri="{FF2B5EF4-FFF2-40B4-BE49-F238E27FC236}">
+                <a16:creationId xmlns:a16="http://schemas.microsoft.com/office/drawing/2014/main" id="{CB3C2654-3E1A-BA52-3144-705603CDD516}"/>
+              </a:ext>
+            </a:extLst>
+          </p:cNvPr>
+          <p:cNvSpPr>
+            <a:spLocks noGrp="1"/>
+          </p:cNvSpPr>
+          <p:nvPr>
+            <p:ph type="title"/>
+          </p:nvPr>
+        </p:nvSpPr>
+        <p:spPr/>
+        <p:txBody>
+          <a:bodyPr/>
+          <a:lstStyle/>
+          <a:p>
+            <a:endParaRPr lang="en-ID"/>
+          </a:p>
+        </p:txBody>
+      </p:sp>
+      <p:pic>
+        <p:nvPicPr>
+          <p:cNvPr id="4" name="Picture 3">
+            <a:extLst>
+              <a:ext uri="{FF2B5EF4-FFF2-40B4-BE49-F238E27FC236}">
+                <a16:creationId xmlns:a16="http://schemas.microsoft.com/office/drawing/2014/main" id="{6D0CDDCE-606F-85FE-7DDE-02EED72E4C25}"/>
+              </a:ext>
+            </a:extLst>
+          </p:cNvPr>
+          <p:cNvPicPr>
+            <a:picLocks noChangeAspect="1"/>
+          </p:cNvPicPr>
+          <p:nvPr/>
+        </p:nvPicPr>
+        <p:blipFill>
+          <a:blip r:embed="rId2"/>
+          <a:stretch>
+            <a:fillRect/>
+          </a:stretch>
+        </p:blipFill>
+        <p:spPr>
+          <a:xfrm>
+            <a:off x="0" y="1524000"/>
+            <a:ext cx="4810125" cy="3619500"/>
+          </a:xfrm>
+          <a:prstGeom prst="rect">
+            <a:avLst/>
+          </a:prstGeom>
+        </p:spPr>
+      </p:pic>
+      <p:sp>
+        <p:nvSpPr>
+          <p:cNvPr id="5" name="TextBox 4">
+            <a:extLst>
+              <a:ext uri="{FF2B5EF4-FFF2-40B4-BE49-F238E27FC236}">
+                <a16:creationId xmlns:a16="http://schemas.microsoft.com/office/drawing/2014/main" id="{D33F5A55-E2D9-1CC7-9564-A569A25857C1}"/>
+              </a:ext>
+            </a:extLst>
+          </p:cNvPr>
+          <p:cNvSpPr txBox="1"/>
+          <p:nvPr/>
+        </p:nvSpPr>
+        <p:spPr>
+          <a:xfrm>
+            <a:off x="5380892" y="1765495"/>
+            <a:ext cx="3355145" cy="2677656"/>
+          </a:xfrm>
+          <a:prstGeom prst="rect">
+            <a:avLst/>
+          </a:prstGeom>
+          <a:noFill/>
+        </p:spPr>
+        <p:txBody>
+          <a:bodyPr wrap="square" rtlCol="0">
+            <a:spAutoFit/>
+          </a:bodyPr>
+          <a:lstStyle/>
+          <a:p>
+            <a:pPr algn="just"/>
+            <a:r>
+              <a:rPr lang="en-US" dirty="0"/>
+              <a:t>Lead Time </a:t>
+            </a:r>
+            <a:r>
+              <a:rPr lang="en-US" dirty="0" err="1"/>
+              <a:t>adalah</a:t>
+            </a:r>
+            <a:r>
+              <a:rPr lang="en-US" dirty="0"/>
+              <a:t> </a:t>
+            </a:r>
+            <a:r>
+              <a:rPr lang="en-US" dirty="0" err="1"/>
+              <a:t>waktu</a:t>
+            </a:r>
+            <a:r>
+              <a:rPr lang="en-US" dirty="0"/>
+              <a:t> </a:t>
+            </a:r>
+            <a:r>
+              <a:rPr lang="en-US" dirty="0" err="1"/>
+              <a:t>antara</a:t>
+            </a:r>
+            <a:r>
+              <a:rPr lang="en-US" dirty="0"/>
+              <a:t> </a:t>
+            </a:r>
+            <a:r>
+              <a:rPr lang="en-US" dirty="0" err="1"/>
+              <a:t>pesanan</a:t>
+            </a:r>
+            <a:r>
+              <a:rPr lang="en-US" dirty="0"/>
+              <a:t> </a:t>
+            </a:r>
+            <a:r>
+              <a:rPr lang="en-US" dirty="0" err="1"/>
+              <a:t>diterima</a:t>
+            </a:r>
+            <a:r>
+              <a:rPr lang="en-US" dirty="0"/>
+              <a:t> dan </a:t>
+            </a:r>
+            <a:r>
+              <a:rPr lang="en-US" dirty="0" err="1"/>
+              <a:t>diproses</a:t>
+            </a:r>
+            <a:r>
+              <a:rPr lang="en-US" dirty="0"/>
+              <a:t> </a:t>
+            </a:r>
+            <a:r>
+              <a:rPr lang="en-US" dirty="0" err="1"/>
+              <a:t>hingga</a:t>
+            </a:r>
+            <a:r>
+              <a:rPr lang="en-US" dirty="0"/>
+              <a:t> </a:t>
+            </a:r>
+            <a:r>
+              <a:rPr lang="en-US" dirty="0" err="1"/>
+              <a:t>hari</a:t>
+            </a:r>
+            <a:r>
+              <a:rPr lang="en-US" dirty="0"/>
+              <a:t>-H.</a:t>
+            </a:r>
+          </a:p>
+          <a:p>
+            <a:pPr algn="just"/>
+            <a:endParaRPr lang="en-US" dirty="0"/>
+          </a:p>
+          <a:p>
+            <a:pPr algn="just"/>
+            <a:r>
+              <a:rPr lang="en-US" dirty="0"/>
+              <a:t>Gambar di </a:t>
+            </a:r>
+            <a:r>
+              <a:rPr lang="en-US" dirty="0" err="1"/>
+              <a:t>samping</a:t>
+            </a:r>
+            <a:r>
+              <a:rPr lang="en-US" dirty="0"/>
+              <a:t> </a:t>
+            </a:r>
+            <a:r>
+              <a:rPr lang="en-US" dirty="0" err="1"/>
+              <a:t>merupakan</a:t>
+            </a:r>
+            <a:r>
+              <a:rPr lang="en-US" dirty="0"/>
+              <a:t> </a:t>
+            </a:r>
+            <a:r>
+              <a:rPr lang="en-US" dirty="0" err="1"/>
+              <a:t>hubungan</a:t>
+            </a:r>
+            <a:r>
+              <a:rPr lang="en-US" dirty="0"/>
+              <a:t> </a:t>
+            </a:r>
+            <a:r>
+              <a:rPr lang="en-US" dirty="0" err="1"/>
+              <a:t>antara</a:t>
+            </a:r>
+            <a:r>
+              <a:rPr lang="en-US" dirty="0"/>
+              <a:t> </a:t>
+            </a:r>
+            <a:r>
+              <a:rPr lang="en-US" dirty="0" err="1"/>
+              <a:t>waktu</a:t>
+            </a:r>
+            <a:r>
+              <a:rPr lang="en-US" dirty="0"/>
+              <a:t> </a:t>
+            </a:r>
+            <a:r>
+              <a:rPr lang="en-US" dirty="0" err="1"/>
+              <a:t>tunggu</a:t>
+            </a:r>
+            <a:r>
+              <a:rPr lang="en-US" dirty="0"/>
+              <a:t> dan ratio cancel. </a:t>
+            </a:r>
+            <a:r>
+              <a:rPr lang="en-US" dirty="0" err="1"/>
+              <a:t>Diperoleh</a:t>
+            </a:r>
+            <a:r>
+              <a:rPr lang="en-US" dirty="0"/>
+              <a:t> </a:t>
+            </a:r>
+            <a:r>
+              <a:rPr lang="en-US" dirty="0" err="1"/>
+              <a:t>informasi</a:t>
+            </a:r>
+            <a:r>
+              <a:rPr lang="en-US" dirty="0"/>
+              <a:t> </a:t>
+            </a:r>
+            <a:r>
+              <a:rPr lang="en-US" dirty="0" err="1"/>
+              <a:t>bahwa</a:t>
+            </a:r>
+            <a:r>
+              <a:rPr lang="en-US" dirty="0"/>
+              <a:t> </a:t>
+            </a:r>
+            <a:r>
+              <a:rPr lang="en-US" dirty="0" err="1"/>
+              <a:t>calon</a:t>
+            </a:r>
+            <a:r>
+              <a:rPr lang="en-US" dirty="0"/>
+              <a:t> visitor yang </a:t>
+            </a:r>
+            <a:r>
+              <a:rPr lang="en-US" dirty="0" err="1"/>
+              <a:t>menunggu</a:t>
+            </a:r>
+            <a:r>
+              <a:rPr lang="en-US" dirty="0"/>
+              <a:t> </a:t>
+            </a:r>
+            <a:r>
+              <a:rPr lang="en-US" dirty="0" err="1"/>
+              <a:t>waktu</a:t>
+            </a:r>
+            <a:r>
+              <a:rPr lang="en-US" dirty="0"/>
+              <a:t> lama (</a:t>
+            </a:r>
+            <a:r>
+              <a:rPr lang="en-US" dirty="0" err="1"/>
+              <a:t>lebih</a:t>
+            </a:r>
+            <a:r>
+              <a:rPr lang="en-US" dirty="0"/>
+              <a:t> </a:t>
+            </a:r>
+            <a:r>
+              <a:rPr lang="en-US" dirty="0" err="1"/>
+              <a:t>dari</a:t>
+            </a:r>
+            <a:r>
+              <a:rPr lang="en-US" dirty="0"/>
+              <a:t> 365 </a:t>
+            </a:r>
+            <a:r>
+              <a:rPr lang="en-US" dirty="0" err="1"/>
+              <a:t>hari</a:t>
+            </a:r>
+            <a:r>
+              <a:rPr lang="en-US" dirty="0"/>
+              <a:t>) </a:t>
+            </a:r>
+            <a:r>
+              <a:rPr lang="en-US" dirty="0" err="1"/>
+              <a:t>cenderung</a:t>
+            </a:r>
+            <a:r>
+              <a:rPr lang="en-US" dirty="0"/>
+              <a:t> </a:t>
+            </a:r>
+            <a:r>
+              <a:rPr lang="en-US" dirty="0" err="1"/>
+              <a:t>untuk</a:t>
+            </a:r>
+            <a:r>
+              <a:rPr lang="en-US" dirty="0"/>
+              <a:t> cancel. </a:t>
+            </a:r>
+            <a:r>
+              <a:rPr lang="en-US" dirty="0" err="1"/>
+              <a:t>Mengingat</a:t>
+            </a:r>
+            <a:r>
+              <a:rPr lang="en-US" dirty="0"/>
+              <a:t> </a:t>
+            </a:r>
+            <a:r>
+              <a:rPr lang="en-US" dirty="0" err="1"/>
+              <a:t>sifat</a:t>
+            </a:r>
+            <a:r>
+              <a:rPr lang="en-US" dirty="0"/>
+              <a:t> </a:t>
+            </a:r>
+            <a:r>
+              <a:rPr lang="en-US" dirty="0" err="1"/>
+              <a:t>manusia</a:t>
+            </a:r>
+            <a:r>
+              <a:rPr lang="en-US" dirty="0"/>
+              <a:t> yang </a:t>
+            </a:r>
+            <a:r>
+              <a:rPr lang="en-US" dirty="0" err="1"/>
+              <a:t>tidak</a:t>
+            </a:r>
+            <a:r>
+              <a:rPr lang="en-US" dirty="0"/>
+              <a:t> </a:t>
+            </a:r>
+            <a:r>
+              <a:rPr lang="en-US" dirty="0" err="1"/>
+              <a:t>suka</a:t>
+            </a:r>
+            <a:r>
+              <a:rPr lang="en-US" dirty="0"/>
+              <a:t> </a:t>
+            </a:r>
+            <a:r>
+              <a:rPr lang="en-US" dirty="0" err="1"/>
+              <a:t>menunggu</a:t>
+            </a:r>
+            <a:r>
+              <a:rPr lang="en-US" dirty="0"/>
+              <a:t> </a:t>
+            </a:r>
+            <a:r>
+              <a:rPr lang="en-US" dirty="0" err="1"/>
+              <a:t>hal</a:t>
+            </a:r>
+            <a:r>
+              <a:rPr lang="en-US" dirty="0"/>
+              <a:t> </a:t>
+            </a:r>
+            <a:r>
+              <a:rPr lang="en-US" dirty="0" err="1"/>
+              <a:t>ini</a:t>
+            </a:r>
+            <a:r>
+              <a:rPr lang="en-US" dirty="0"/>
+              <a:t> </a:t>
+            </a:r>
+            <a:r>
+              <a:rPr lang="en-US" dirty="0" err="1"/>
+              <a:t>bisa</a:t>
+            </a:r>
+            <a:r>
+              <a:rPr lang="en-US" dirty="0"/>
+              <a:t> </a:t>
+            </a:r>
+            <a:r>
+              <a:rPr lang="en-US" dirty="0" err="1"/>
+              <a:t>saja</a:t>
+            </a:r>
+            <a:r>
+              <a:rPr lang="en-US" dirty="0"/>
+              <a:t> </a:t>
+            </a:r>
+            <a:r>
+              <a:rPr lang="en-US" dirty="0" err="1"/>
+              <a:t>terjadi</a:t>
+            </a:r>
+            <a:endParaRPr lang="en-ID" dirty="0"/>
+          </a:p>
+        </p:txBody>
+      </p:sp>
+    </p:spTree>
+    <p:extLst>
+      <p:ext uri="{BB962C8B-B14F-4D97-AF65-F5344CB8AC3E}">
+        <p14:creationId xmlns:p14="http://schemas.microsoft.com/office/powerpoint/2010/main" val="826515906"/>
       </p:ext>
     </p:extLst>
   </p:cSld>

</xml_diff>